<commit_message>
doc(Design): change introduction design
</commit_message>
<xml_diff>
--- a/Design/loop.pptx
+++ b/Design/loop.pptx
@@ -105,6 +105,11 @@
       </a:defRPr>
     </a:lvl9pPr>
   </p:defaultTextStyle>
+  <p:extLst>
+    <p:ext uri="{EFAFB233-063F-42B5-8137-9DF3F51BA10A}">
+      <p15:sldGuideLst xmlns:p15="http://schemas.microsoft.com/office/powerpoint/2012/main"/>
+    </p:ext>
+  </p:extLst>
 </p:presentation>
 </file>
 
@@ -3336,8 +3341,8 @@
         </p:nvSpPr>
         <p:spPr>
           <a:xfrm>
-            <a:off x="2122954" y="796738"/>
-            <a:ext cx="6465461" cy="5232202"/>
+            <a:off x="2122953" y="796738"/>
+            <a:ext cx="7200000" cy="4402800"/>
           </a:xfrm>
           <a:prstGeom prst="rect">
             <a:avLst/>
@@ -3351,18 +3356,6 @@
             <a:spAutoFit/>
           </a:bodyPr>
           <a:lstStyle/>
-          <a:p>
-            <a:pPr>
-              <a:lnSpc>
-                <a:spcPct val="150000"/>
-              </a:lnSpc>
-            </a:pPr>
-            <a:endParaRPr lang="en-US" altLang="zh-CN" sz="2000" dirty="0">
-              <a:solidFill>
-                <a:srgbClr val="FF6F00"/>
-              </a:solidFill>
-            </a:endParaRPr>
-          </a:p>
           <a:p>
             <a:pPr>
               <a:lnSpc>
@@ -3614,8 +3607,8 @@
         </p:nvSpPr>
         <p:spPr>
           <a:xfrm>
-            <a:off x="1451623" y="302049"/>
-            <a:ext cx="6465461" cy="5601533"/>
+            <a:off x="1451622" y="302049"/>
+            <a:ext cx="7200000" cy="4402800"/>
           </a:xfrm>
           <a:prstGeom prst="rect">
             <a:avLst/>
@@ -3635,22 +3628,11 @@
                 <a:spcPct val="150000"/>
               </a:lnSpc>
             </a:pPr>
-            <a:endParaRPr lang="en-US" altLang="zh-CN" sz="2000" dirty="0">
+            <a:endParaRPr lang="en-US" altLang="zh-CN" sz="2800" b="1" dirty="0">
               <a:solidFill>
                 <a:srgbClr val="FF6F00"/>
               </a:solidFill>
-            </a:endParaRPr>
-          </a:p>
-          <a:p>
-            <a:pPr>
-              <a:lnSpc>
-                <a:spcPct val="150000"/>
-              </a:lnSpc>
-            </a:pPr>
-            <a:endParaRPr lang="en-US" altLang="zh-CN" sz="2000" dirty="0">
-              <a:solidFill>
-                <a:srgbClr val="FF6F00"/>
-              </a:solidFill>
+              <a:latin typeface="Quicksand" pitchFamily="2" charset="0"/>
             </a:endParaRPr>
           </a:p>
           <a:p>

</xml_diff>